<commit_message>
added strat pattern example
</commit_message>
<xml_diff>
--- a/active-record-pattern.pptx
+++ b/active-record-pattern.pptx
@@ -112,7 +112,16 @@
       </a:defRPr>
     </a:lvl9pPr>
   </p:defaultTextStyle>
+  <p:extLst>
+    <p:ext uri="{EFAFB233-063F-42B5-8137-9DF3F51BA10A}">
+      <p15:sldGuideLst xmlns:p15="http://schemas.microsoft.com/office/powerpoint/2012/main"/>
+    </p:ext>
+  </p:extLst>
 </p:presentation>
+</file>
+
+<file path=ppt/revisionInfo.xml><?xml version="1.0" encoding="utf-8"?>
+<p1510:revInfo xmlns:a="http://schemas.openxmlformats.org/drawingml/2006/main" xmlns:r="http://schemas.openxmlformats.org/officeDocument/2006/relationships" xmlns:p1510="http://schemas.microsoft.com/office/powerpoint/2015/10/main"/>
 </file>
 
 <file path=ppt/slideLayouts/slideLayout1.xml><?xml version="1.0" encoding="utf-8"?>
@@ -165,7 +174,7 @@
           <a:noFill/>
           <a:extLst>
             <a:ext uri="{909E8E84-426E-40dd-AFC4-6F175D3DCCD1}">
-              <a14:hiddenFill xmlns:a14="http://schemas.microsoft.com/office/drawing/2010/main" xmlns="">
+              <a14:hiddenFill xmlns="" xmlns:a14="http://schemas.microsoft.com/office/drawing/2010/main">
                 <a:solidFill>
                   <a:srgbClr val="FFFFFF"/>
                 </a:solidFill>
@@ -225,7 +234,7 @@
             </a:ln>
             <a:extLst>
               <a:ext uri="{91240B29-F687-4f45-9708-019B960494DF}">
-                <a14:hiddenLine xmlns:a14="http://schemas.microsoft.com/office/drawing/2010/main" xmlns="" w="9525">
+                <a14:hiddenLine xmlns="" xmlns:a14="http://schemas.microsoft.com/office/drawing/2010/main" w="9525">
                   <a:solidFill>
                     <a:srgbClr val="000000"/>
                   </a:solidFill>
@@ -315,7 +324,7 @@
             </a:ln>
             <a:extLst>
               <a:ext uri="{91240B29-F687-4f45-9708-019B960494DF}">
-                <a14:hiddenLine xmlns:a14="http://schemas.microsoft.com/office/drawing/2010/main" xmlns="" w="9525">
+                <a14:hiddenLine xmlns="" xmlns:a14="http://schemas.microsoft.com/office/drawing/2010/main" w="9525">
                   <a:solidFill>
                     <a:srgbClr val="000000"/>
                   </a:solidFill>
@@ -405,7 +414,7 @@
             </a:ln>
             <a:extLst>
               <a:ext uri="{91240B29-F687-4f45-9708-019B960494DF}">
-                <a14:hiddenLine xmlns:a14="http://schemas.microsoft.com/office/drawing/2010/main" xmlns="" w="9525">
+                <a14:hiddenLine xmlns="" xmlns:a14="http://schemas.microsoft.com/office/drawing/2010/main" w="9525">
                   <a:solidFill>
                     <a:srgbClr val="000000"/>
                   </a:solidFill>
@@ -439,7 +448,7 @@
             </a:ln>
             <a:extLst>
               <a:ext uri="{91240B29-F687-4f45-9708-019B960494DF}">
-                <a14:hiddenLine xmlns:a14="http://schemas.microsoft.com/office/drawing/2010/main" xmlns="" w="9525">
+                <a14:hiddenLine xmlns="" xmlns:a14="http://schemas.microsoft.com/office/drawing/2010/main" w="9525">
                   <a:solidFill>
                     <a:srgbClr val="000000"/>
                   </a:solidFill>
@@ -529,7 +538,7 @@
             </a:ln>
             <a:extLst>
               <a:ext uri="{91240B29-F687-4f45-9708-019B960494DF}">
-                <a14:hiddenLine xmlns:a14="http://schemas.microsoft.com/office/drawing/2010/main" xmlns="" w="9525">
+                <a14:hiddenLine xmlns="" xmlns:a14="http://schemas.microsoft.com/office/drawing/2010/main" w="9525">
                   <a:solidFill>
                     <a:srgbClr val="000000"/>
                   </a:solidFill>
@@ -591,7 +600,7 @@
             </a:ln>
             <a:extLst>
               <a:ext uri="{91240B29-F687-4f45-9708-019B960494DF}">
-                <a14:hiddenLine xmlns:a14="http://schemas.microsoft.com/office/drawing/2010/main" xmlns="" w="9525">
+                <a14:hiddenLine xmlns="" xmlns:a14="http://schemas.microsoft.com/office/drawing/2010/main" w="9525">
                   <a:solidFill>
                     <a:srgbClr val="000000"/>
                   </a:solidFill>
@@ -653,7 +662,7 @@
             </a:ln>
             <a:extLst>
               <a:ext uri="{91240B29-F687-4f45-9708-019B960494DF}">
-                <a14:hiddenLine xmlns:a14="http://schemas.microsoft.com/office/drawing/2010/main" xmlns="" w="9525">
+                <a14:hiddenLine xmlns="" xmlns:a14="http://schemas.microsoft.com/office/drawing/2010/main" w="9525">
                   <a:solidFill>
                     <a:srgbClr val="000000"/>
                   </a:solidFill>
@@ -743,7 +752,7 @@
             </a:ln>
             <a:extLst>
               <a:ext uri="{91240B29-F687-4f45-9708-019B960494DF}">
-                <a14:hiddenLine xmlns:a14="http://schemas.microsoft.com/office/drawing/2010/main" xmlns="" w="9525">
+                <a14:hiddenLine xmlns="" xmlns:a14="http://schemas.microsoft.com/office/drawing/2010/main" w="9525">
                   <a:solidFill>
                     <a:srgbClr val="000000"/>
                   </a:solidFill>
@@ -805,7 +814,7 @@
             </a:ln>
             <a:extLst>
               <a:ext uri="{91240B29-F687-4f45-9708-019B960494DF}">
-                <a14:hiddenLine xmlns:a14="http://schemas.microsoft.com/office/drawing/2010/main" xmlns="" w="9525">
+                <a14:hiddenLine xmlns="" xmlns:a14="http://schemas.microsoft.com/office/drawing/2010/main" w="9525">
                   <a:solidFill>
                     <a:srgbClr val="000000"/>
                   </a:solidFill>
@@ -867,7 +876,7 @@
             </a:ln>
             <a:extLst>
               <a:ext uri="{91240B29-F687-4f45-9708-019B960494DF}">
-                <a14:hiddenLine xmlns:a14="http://schemas.microsoft.com/office/drawing/2010/main" xmlns="" w="9525">
+                <a14:hiddenLine xmlns="" xmlns:a14="http://schemas.microsoft.com/office/drawing/2010/main" w="9525">
                   <a:solidFill>
                     <a:srgbClr val="000000"/>
                   </a:solidFill>
@@ -957,7 +966,7 @@
             </a:ln>
             <a:extLst>
               <a:ext uri="{91240B29-F687-4f45-9708-019B960494DF}">
-                <a14:hiddenLine xmlns:a14="http://schemas.microsoft.com/office/drawing/2010/main" xmlns="" w="9525">
+                <a14:hiddenLine xmlns="" xmlns:a14="http://schemas.microsoft.com/office/drawing/2010/main" w="9525">
                   <a:solidFill>
                     <a:srgbClr val="000000"/>
                   </a:solidFill>
@@ -1047,7 +1056,7 @@
             </a:ln>
             <a:extLst>
               <a:ext uri="{91240B29-F687-4f45-9708-019B960494DF}">
-                <a14:hiddenLine xmlns:a14="http://schemas.microsoft.com/office/drawing/2010/main" xmlns="" w="9525">
+                <a14:hiddenLine xmlns="" xmlns:a14="http://schemas.microsoft.com/office/drawing/2010/main" w="9525">
                   <a:solidFill>
                     <a:srgbClr val="000000"/>
                   </a:solidFill>
@@ -1109,7 +1118,7 @@
             </a:ln>
             <a:extLst>
               <a:ext uri="{91240B29-F687-4f45-9708-019B960494DF}">
-                <a14:hiddenLine xmlns:a14="http://schemas.microsoft.com/office/drawing/2010/main" xmlns="" w="9525">
+                <a14:hiddenLine xmlns="" xmlns:a14="http://schemas.microsoft.com/office/drawing/2010/main" w="9525">
                   <a:solidFill>
                     <a:srgbClr val="000000"/>
                   </a:solidFill>
@@ -1219,7 +1228,7 @@
             </a:ln>
             <a:extLst>
               <a:ext uri="{91240B29-F687-4f45-9708-019B960494DF}">
-                <a14:hiddenLine xmlns:a14="http://schemas.microsoft.com/office/drawing/2010/main" xmlns="" w="9525">
+                <a14:hiddenLine xmlns="" xmlns:a14="http://schemas.microsoft.com/office/drawing/2010/main" w="9525">
                   <a:solidFill>
                     <a:srgbClr val="000000"/>
                   </a:solidFill>
@@ -1281,7 +1290,7 @@
             </a:ln>
             <a:extLst>
               <a:ext uri="{91240B29-F687-4f45-9708-019B960494DF}">
-                <a14:hiddenLine xmlns:a14="http://schemas.microsoft.com/office/drawing/2010/main" xmlns="" w="9525">
+                <a14:hiddenLine xmlns="" xmlns:a14="http://schemas.microsoft.com/office/drawing/2010/main" w="9525">
                   <a:solidFill>
                     <a:srgbClr val="000000"/>
                   </a:solidFill>
@@ -1371,7 +1380,7 @@
             </a:ln>
             <a:extLst>
               <a:ext uri="{91240B29-F687-4f45-9708-019B960494DF}">
-                <a14:hiddenLine xmlns:a14="http://schemas.microsoft.com/office/drawing/2010/main" xmlns="" w="9525">
+                <a14:hiddenLine xmlns="" xmlns:a14="http://schemas.microsoft.com/office/drawing/2010/main" w="9525">
                   <a:solidFill>
                     <a:srgbClr val="000000"/>
                   </a:solidFill>
@@ -1461,7 +1470,7 @@
             </a:ln>
             <a:extLst>
               <a:ext uri="{91240B29-F687-4f45-9708-019B960494DF}">
-                <a14:hiddenLine xmlns:a14="http://schemas.microsoft.com/office/drawing/2010/main" xmlns="" w="9525">
+                <a14:hiddenLine xmlns="" xmlns:a14="http://schemas.microsoft.com/office/drawing/2010/main" w="9525">
                   <a:solidFill>
                     <a:srgbClr val="000000"/>
                   </a:solidFill>
@@ -1523,7 +1532,7 @@
             </a:ln>
             <a:extLst>
               <a:ext uri="{91240B29-F687-4f45-9708-019B960494DF}">
-                <a14:hiddenLine xmlns:a14="http://schemas.microsoft.com/office/drawing/2010/main" xmlns="" w="9525">
+                <a14:hiddenLine xmlns="" xmlns:a14="http://schemas.microsoft.com/office/drawing/2010/main" w="9525">
                   <a:solidFill>
                     <a:srgbClr val="000000"/>
                   </a:solidFill>
@@ -1613,7 +1622,7 @@
             </a:ln>
             <a:extLst>
               <a:ext uri="{91240B29-F687-4f45-9708-019B960494DF}">
-                <a14:hiddenLine xmlns:a14="http://schemas.microsoft.com/office/drawing/2010/main" xmlns="" w="9525">
+                <a14:hiddenLine xmlns="" xmlns:a14="http://schemas.microsoft.com/office/drawing/2010/main" w="9525">
                   <a:solidFill>
                     <a:srgbClr val="000000"/>
                   </a:solidFill>
@@ -1703,7 +1712,7 @@
             </a:ln>
             <a:extLst>
               <a:ext uri="{91240B29-F687-4f45-9708-019B960494DF}">
-                <a14:hiddenLine xmlns:a14="http://schemas.microsoft.com/office/drawing/2010/main" xmlns="" w="9525">
+                <a14:hiddenLine xmlns="" xmlns:a14="http://schemas.microsoft.com/office/drawing/2010/main" w="9525">
                   <a:solidFill>
                     <a:srgbClr val="000000"/>
                   </a:solidFill>
@@ -1759,7 +1768,7 @@
             </a:ln>
             <a:extLst>
               <a:ext uri="{91240B29-F687-4f45-9708-019B960494DF}">
-                <a14:hiddenLine xmlns:a14="http://schemas.microsoft.com/office/drawing/2010/main" xmlns="" w="9525">
+                <a14:hiddenLine xmlns="" xmlns:a14="http://schemas.microsoft.com/office/drawing/2010/main" w="9525">
                   <a:solidFill>
                     <a:srgbClr val="000000"/>
                   </a:solidFill>
@@ -1849,7 +1858,7 @@
             </a:ln>
             <a:extLst>
               <a:ext uri="{91240B29-F687-4f45-9708-019B960494DF}">
-                <a14:hiddenLine xmlns:a14="http://schemas.microsoft.com/office/drawing/2010/main" xmlns="" w="9525">
+                <a14:hiddenLine xmlns="" xmlns:a14="http://schemas.microsoft.com/office/drawing/2010/main" w="9525">
                   <a:solidFill>
                     <a:srgbClr val="000000"/>
                   </a:solidFill>
@@ -1905,7 +1914,7 @@
             </a:ln>
             <a:extLst>
               <a:ext uri="{91240B29-F687-4f45-9708-019B960494DF}">
-                <a14:hiddenLine xmlns:a14="http://schemas.microsoft.com/office/drawing/2010/main" xmlns="" w="9525">
+                <a14:hiddenLine xmlns="" xmlns:a14="http://schemas.microsoft.com/office/drawing/2010/main" w="9525">
                   <a:solidFill>
                     <a:srgbClr val="000000"/>
                   </a:solidFill>
@@ -1995,7 +2004,7 @@
             </a:ln>
             <a:extLst>
               <a:ext uri="{91240B29-F687-4f45-9708-019B960494DF}">
-                <a14:hiddenLine xmlns:a14="http://schemas.microsoft.com/office/drawing/2010/main" xmlns="" w="9525">
+                <a14:hiddenLine xmlns="" xmlns:a14="http://schemas.microsoft.com/office/drawing/2010/main" w="9525">
                   <a:solidFill>
                     <a:srgbClr val="000000"/>
                   </a:solidFill>
@@ -2063,7 +2072,7 @@
             </a:ln>
             <a:extLst>
               <a:ext uri="{91240B29-F687-4f45-9708-019B960494DF}">
-                <a14:hiddenLine xmlns:a14="http://schemas.microsoft.com/office/drawing/2010/main" xmlns="" w="9525">
+                <a14:hiddenLine xmlns="" xmlns:a14="http://schemas.microsoft.com/office/drawing/2010/main" w="9525">
                   <a:solidFill>
                     <a:srgbClr val="000000"/>
                   </a:solidFill>
@@ -2153,7 +2162,7 @@
             </a:ln>
             <a:extLst>
               <a:ext uri="{91240B29-F687-4f45-9708-019B960494DF}">
-                <a14:hiddenLine xmlns:a14="http://schemas.microsoft.com/office/drawing/2010/main" xmlns="" w="9525">
+                <a14:hiddenLine xmlns="" xmlns:a14="http://schemas.microsoft.com/office/drawing/2010/main" w="9525">
                   <a:solidFill>
                     <a:srgbClr val="000000"/>
                   </a:solidFill>
@@ -2221,7 +2230,7 @@
             </a:ln>
             <a:extLst>
               <a:ext uri="{91240B29-F687-4f45-9708-019B960494DF}">
-                <a14:hiddenLine xmlns:a14="http://schemas.microsoft.com/office/drawing/2010/main" xmlns="" w="9525">
+                <a14:hiddenLine xmlns="" xmlns:a14="http://schemas.microsoft.com/office/drawing/2010/main" w="9525">
                   <a:solidFill>
                     <a:srgbClr val="000000"/>
                   </a:solidFill>
@@ -2311,7 +2320,7 @@
             </a:ln>
             <a:extLst>
               <a:ext uri="{91240B29-F687-4f45-9708-019B960494DF}">
-                <a14:hiddenLine xmlns:a14="http://schemas.microsoft.com/office/drawing/2010/main" xmlns="" w="9525">
+                <a14:hiddenLine xmlns="" xmlns:a14="http://schemas.microsoft.com/office/drawing/2010/main" w="9525">
                   <a:solidFill>
                     <a:srgbClr val="000000"/>
                   </a:solidFill>
@@ -2345,7 +2354,7 @@
             </a:ln>
             <a:extLst>
               <a:ext uri="{91240B29-F687-4f45-9708-019B960494DF}">
-                <a14:hiddenLine xmlns:a14="http://schemas.microsoft.com/office/drawing/2010/main" xmlns="" w="9525">
+                <a14:hiddenLine xmlns="" xmlns:a14="http://schemas.microsoft.com/office/drawing/2010/main" w="9525">
                   <a:solidFill>
                     <a:srgbClr val="000000"/>
                   </a:solidFill>
@@ -2435,7 +2444,7 @@
             </a:ln>
             <a:extLst>
               <a:ext uri="{91240B29-F687-4f45-9708-019B960494DF}">
-                <a14:hiddenLine xmlns:a14="http://schemas.microsoft.com/office/drawing/2010/main" xmlns="" w="9525">
+                <a14:hiddenLine xmlns="" xmlns:a14="http://schemas.microsoft.com/office/drawing/2010/main" w="9525">
                   <a:solidFill>
                     <a:srgbClr val="000000"/>
                   </a:solidFill>
@@ -2497,7 +2506,7 @@
             </a:ln>
             <a:extLst>
               <a:ext uri="{91240B29-F687-4f45-9708-019B960494DF}">
-                <a14:hiddenLine xmlns:a14="http://schemas.microsoft.com/office/drawing/2010/main" xmlns="" w="9525">
+                <a14:hiddenLine xmlns="" xmlns:a14="http://schemas.microsoft.com/office/drawing/2010/main" w="9525">
                   <a:solidFill>
                     <a:srgbClr val="000000"/>
                   </a:solidFill>
@@ -2559,7 +2568,7 @@
             </a:ln>
             <a:extLst>
               <a:ext uri="{91240B29-F687-4f45-9708-019B960494DF}">
-                <a14:hiddenLine xmlns:a14="http://schemas.microsoft.com/office/drawing/2010/main" xmlns="" w="9525">
+                <a14:hiddenLine xmlns="" xmlns:a14="http://schemas.microsoft.com/office/drawing/2010/main" w="9525">
                   <a:solidFill>
                     <a:srgbClr val="000000"/>
                   </a:solidFill>
@@ -2649,7 +2658,7 @@
             </a:ln>
             <a:extLst>
               <a:ext uri="{91240B29-F687-4f45-9708-019B960494DF}">
-                <a14:hiddenLine xmlns:a14="http://schemas.microsoft.com/office/drawing/2010/main" xmlns="" w="9525">
+                <a14:hiddenLine xmlns="" xmlns:a14="http://schemas.microsoft.com/office/drawing/2010/main" w="9525">
                   <a:solidFill>
                     <a:srgbClr val="000000"/>
                   </a:solidFill>
@@ -2717,7 +2726,7 @@
             </a:ln>
             <a:extLst>
               <a:ext uri="{91240B29-F687-4f45-9708-019B960494DF}">
-                <a14:hiddenLine xmlns:a14="http://schemas.microsoft.com/office/drawing/2010/main" xmlns="" w="9525">
+                <a14:hiddenLine xmlns="" xmlns:a14="http://schemas.microsoft.com/office/drawing/2010/main" w="9525">
                   <a:solidFill>
                     <a:srgbClr val="000000"/>
                   </a:solidFill>
@@ -2779,7 +2788,7 @@
             </a:ln>
             <a:extLst>
               <a:ext uri="{91240B29-F687-4f45-9708-019B960494DF}">
-                <a14:hiddenLine xmlns:a14="http://schemas.microsoft.com/office/drawing/2010/main" xmlns="" w="9525">
+                <a14:hiddenLine xmlns="" xmlns:a14="http://schemas.microsoft.com/office/drawing/2010/main" w="9525">
                   <a:solidFill>
                     <a:srgbClr val="000000"/>
                   </a:solidFill>
@@ -2869,7 +2878,7 @@
             </a:ln>
             <a:extLst>
               <a:ext uri="{91240B29-F687-4f45-9708-019B960494DF}">
-                <a14:hiddenLine xmlns:a14="http://schemas.microsoft.com/office/drawing/2010/main" xmlns="" w="9525">
+                <a14:hiddenLine xmlns="" xmlns:a14="http://schemas.microsoft.com/office/drawing/2010/main" w="9525">
                   <a:solidFill>
                     <a:srgbClr val="000000"/>
                   </a:solidFill>
@@ -2931,7 +2940,7 @@
             </a:ln>
             <a:extLst>
               <a:ext uri="{91240B29-F687-4f45-9708-019B960494DF}">
-                <a14:hiddenLine xmlns:a14="http://schemas.microsoft.com/office/drawing/2010/main" xmlns="" w="9525">
+                <a14:hiddenLine xmlns="" xmlns:a14="http://schemas.microsoft.com/office/drawing/2010/main" w="9525">
                   <a:solidFill>
                     <a:srgbClr val="000000"/>
                   </a:solidFill>
@@ -3021,7 +3030,7 @@
             </a:ln>
             <a:extLst>
               <a:ext uri="{91240B29-F687-4f45-9708-019B960494DF}">
-                <a14:hiddenLine xmlns:a14="http://schemas.microsoft.com/office/drawing/2010/main" xmlns="" w="9525">
+                <a14:hiddenLine xmlns="" xmlns:a14="http://schemas.microsoft.com/office/drawing/2010/main" w="9525">
                   <a:solidFill>
                     <a:srgbClr val="000000"/>
                   </a:solidFill>
@@ -3083,7 +3092,7 @@
             </a:ln>
             <a:extLst>
               <a:ext uri="{91240B29-F687-4f45-9708-019B960494DF}">
-                <a14:hiddenLine xmlns:a14="http://schemas.microsoft.com/office/drawing/2010/main" xmlns="" w="9525">
+                <a14:hiddenLine xmlns="" xmlns:a14="http://schemas.microsoft.com/office/drawing/2010/main" w="9525">
                   <a:solidFill>
                     <a:srgbClr val="000000"/>
                   </a:solidFill>
@@ -3173,7 +3182,7 @@
             </a:ln>
             <a:extLst>
               <a:ext uri="{91240B29-F687-4f45-9708-019B960494DF}">
-                <a14:hiddenLine xmlns:a14="http://schemas.microsoft.com/office/drawing/2010/main" xmlns="" w="9525">
+                <a14:hiddenLine xmlns="" xmlns:a14="http://schemas.microsoft.com/office/drawing/2010/main" w="9525">
                   <a:solidFill>
                     <a:srgbClr val="000000"/>
                   </a:solidFill>
@@ -3207,7 +3216,7 @@
             </a:ln>
             <a:extLst>
               <a:ext uri="{91240B29-F687-4f45-9708-019B960494DF}">
-                <a14:hiddenLine xmlns:a14="http://schemas.microsoft.com/office/drawing/2010/main" xmlns="" w="9525">
+                <a14:hiddenLine xmlns="" xmlns:a14="http://schemas.microsoft.com/office/drawing/2010/main" w="9525">
                   <a:solidFill>
                     <a:srgbClr val="000000"/>
                   </a:solidFill>
@@ -3272,7 +3281,7 @@
             </a:ln>
             <a:extLst>
               <a:ext uri="{91240B29-F687-4f45-9708-019B960494DF}">
-                <a14:hiddenLine xmlns:a14="http://schemas.microsoft.com/office/drawing/2010/main" xmlns="" w="9525">
+                <a14:hiddenLine xmlns="" xmlns:a14="http://schemas.microsoft.com/office/drawing/2010/main" w="9525">
                   <a:solidFill>
                     <a:srgbClr val="000000"/>
                   </a:solidFill>
@@ -3362,7 +3371,7 @@
             </a:ln>
             <a:extLst>
               <a:ext uri="{91240B29-F687-4f45-9708-019B960494DF}">
-                <a14:hiddenLine xmlns:a14="http://schemas.microsoft.com/office/drawing/2010/main" xmlns="" w="9525">
+                <a14:hiddenLine xmlns="" xmlns:a14="http://schemas.microsoft.com/office/drawing/2010/main" w="9525">
                   <a:solidFill>
                     <a:srgbClr val="000000"/>
                   </a:solidFill>
@@ -3424,7 +3433,7 @@
             </a:ln>
             <a:extLst>
               <a:ext uri="{91240B29-F687-4f45-9708-019B960494DF}">
-                <a14:hiddenLine xmlns:a14="http://schemas.microsoft.com/office/drawing/2010/main" xmlns="" w="9525">
+                <a14:hiddenLine xmlns="" xmlns:a14="http://schemas.microsoft.com/office/drawing/2010/main" w="9525">
                   <a:solidFill>
                     <a:srgbClr val="000000"/>
                   </a:solidFill>
@@ -3514,7 +3523,7 @@
             </a:ln>
             <a:extLst>
               <a:ext uri="{91240B29-F687-4f45-9708-019B960494DF}">
-                <a14:hiddenLine xmlns:a14="http://schemas.microsoft.com/office/drawing/2010/main" xmlns="" w="9525">
+                <a14:hiddenLine xmlns="" xmlns:a14="http://schemas.microsoft.com/office/drawing/2010/main" w="9525">
                   <a:solidFill>
                     <a:srgbClr val="000000"/>
                   </a:solidFill>
@@ -3604,7 +3613,7 @@
             </a:ln>
             <a:extLst>
               <a:ext uri="{91240B29-F687-4f45-9708-019B960494DF}">
-                <a14:hiddenLine xmlns:a14="http://schemas.microsoft.com/office/drawing/2010/main" xmlns="" w="9525">
+                <a14:hiddenLine xmlns="" xmlns:a14="http://schemas.microsoft.com/office/drawing/2010/main" w="9525">
                   <a:solidFill>
                     <a:srgbClr val="000000"/>
                   </a:solidFill>
@@ -3669,7 +3678,7 @@
             </a:ln>
             <a:extLst>
               <a:ext uri="{91240B29-F687-4f45-9708-019B960494DF}">
-                <a14:hiddenLine xmlns:a14="http://schemas.microsoft.com/office/drawing/2010/main" xmlns="" w="9525">
+                <a14:hiddenLine xmlns="" xmlns:a14="http://schemas.microsoft.com/office/drawing/2010/main" w="9525">
                   <a:solidFill>
                     <a:srgbClr val="000000"/>
                   </a:solidFill>
@@ -3731,7 +3740,7 @@
             </a:ln>
             <a:extLst>
               <a:ext uri="{91240B29-F687-4f45-9708-019B960494DF}">
-                <a14:hiddenLine xmlns:a14="http://schemas.microsoft.com/office/drawing/2010/main" xmlns="" w="9525">
+                <a14:hiddenLine xmlns="" xmlns:a14="http://schemas.microsoft.com/office/drawing/2010/main" w="9525">
                   <a:solidFill>
                     <a:srgbClr val="000000"/>
                   </a:solidFill>
@@ -3821,7 +3830,7 @@
             </a:ln>
             <a:extLst>
               <a:ext uri="{91240B29-F687-4f45-9708-019B960494DF}">
-                <a14:hiddenLine xmlns:a14="http://schemas.microsoft.com/office/drawing/2010/main" xmlns="" w="9525">
+                <a14:hiddenLine xmlns="" xmlns:a14="http://schemas.microsoft.com/office/drawing/2010/main" w="9525">
                   <a:solidFill>
                     <a:srgbClr val="000000"/>
                   </a:solidFill>
@@ -3911,7 +3920,7 @@
             </a:ln>
             <a:extLst>
               <a:ext uri="{91240B29-F687-4f45-9708-019B960494DF}">
-                <a14:hiddenLine xmlns:a14="http://schemas.microsoft.com/office/drawing/2010/main" xmlns="" w="9525">
+                <a14:hiddenLine xmlns="" xmlns:a14="http://schemas.microsoft.com/office/drawing/2010/main" w="9525">
                   <a:solidFill>
                     <a:srgbClr val="000000"/>
                   </a:solidFill>
@@ -3973,7 +3982,7 @@
             </a:ln>
             <a:extLst>
               <a:ext uri="{91240B29-F687-4f45-9708-019B960494DF}">
-                <a14:hiddenLine xmlns:a14="http://schemas.microsoft.com/office/drawing/2010/main" xmlns="" w="9525">
+                <a14:hiddenLine xmlns="" xmlns:a14="http://schemas.microsoft.com/office/drawing/2010/main" w="9525">
                   <a:solidFill>
                     <a:srgbClr val="000000"/>
                   </a:solidFill>
@@ -4093,7 +4102,7 @@
             </a:ln>
             <a:extLst>
               <a:ext uri="{91240B29-F687-4f45-9708-019B960494DF}">
-                <a14:hiddenLine xmlns:a14="http://schemas.microsoft.com/office/drawing/2010/main" xmlns="" w="9525">
+                <a14:hiddenLine xmlns="" xmlns:a14="http://schemas.microsoft.com/office/drawing/2010/main" w="9525">
                   <a:solidFill>
                     <a:srgbClr val="000000"/>
                   </a:solidFill>
@@ -4161,7 +4170,7 @@
             </a:ln>
             <a:extLst>
               <a:ext uri="{91240B29-F687-4f45-9708-019B960494DF}">
-                <a14:hiddenLine xmlns:a14="http://schemas.microsoft.com/office/drawing/2010/main" xmlns="" w="9525">
+                <a14:hiddenLine xmlns="" xmlns:a14="http://schemas.microsoft.com/office/drawing/2010/main" w="9525">
                   <a:solidFill>
                     <a:srgbClr val="000000"/>
                   </a:solidFill>
@@ -4251,7 +4260,7 @@
             </a:ln>
             <a:extLst>
               <a:ext uri="{91240B29-F687-4f45-9708-019B960494DF}">
-                <a14:hiddenLine xmlns:a14="http://schemas.microsoft.com/office/drawing/2010/main" xmlns="" w="9525">
+                <a14:hiddenLine xmlns="" xmlns:a14="http://schemas.microsoft.com/office/drawing/2010/main" w="9525">
                   <a:solidFill>
                     <a:srgbClr val="000000"/>
                   </a:solidFill>
@@ -4391,7 +4400,7 @@
           <a:p>
             <a:fld id="{48A87A34-81AB-432B-8DAE-1953F412C126}" type="datetimeFigureOut">
               <a:rPr lang="en-US" dirty="0"/>
-              <a:t>12/5/2017</a:t>
+              <a:t>12/7/2017</a:t>
             </a:fld>
             <a:endParaRPr lang="en-US" dirty="0"/>
           </a:p>
@@ -4653,7 +4662,7 @@
           <a:p>
             <a:fld id="{48A87A34-81AB-432B-8DAE-1953F412C126}" type="datetimeFigureOut">
               <a:rPr lang="en-US" dirty="0"/>
-              <a:t>12/5/2017</a:t>
+              <a:t>12/7/2017</a:t>
             </a:fld>
             <a:endParaRPr lang="en-US" dirty="0"/>
           </a:p>
@@ -4844,7 +4853,7 @@
           <a:p>
             <a:fld id="{48A87A34-81AB-432B-8DAE-1953F412C126}" type="datetimeFigureOut">
               <a:rPr lang="en-US" dirty="0"/>
-              <a:t>12/5/2017</a:t>
+              <a:t>12/7/2017</a:t>
             </a:fld>
             <a:endParaRPr lang="en-US" dirty="0"/>
           </a:p>
@@ -5102,7 +5111,7 @@
           <a:p>
             <a:fld id="{48A87A34-81AB-432B-8DAE-1953F412C126}" type="datetimeFigureOut">
               <a:rPr lang="en-US" dirty="0"/>
-              <a:t>12/5/2017</a:t>
+              <a:t>12/7/2017</a:t>
             </a:fld>
             <a:endParaRPr lang="en-US" dirty="0"/>
           </a:p>
@@ -5531,7 +5540,7 @@
           <a:p>
             <a:fld id="{48A87A34-81AB-432B-8DAE-1953F412C126}" type="datetimeFigureOut">
               <a:rPr lang="en-US" dirty="0"/>
-              <a:t>12/5/2017</a:t>
+              <a:t>12/7/2017</a:t>
             </a:fld>
             <a:endParaRPr lang="en-US" dirty="0"/>
           </a:p>
@@ -6072,7 +6081,7 @@
           <a:p>
             <a:fld id="{48A87A34-81AB-432B-8DAE-1953F412C126}" type="datetimeFigureOut">
               <a:rPr lang="en-US" dirty="0"/>
-              <a:t>12/5/2017</a:t>
+              <a:t>12/7/2017</a:t>
             </a:fld>
             <a:endParaRPr lang="en-US" dirty="0"/>
           </a:p>
@@ -6787,7 +6796,7 @@
           <a:p>
             <a:fld id="{48A87A34-81AB-432B-8DAE-1953F412C126}" type="datetimeFigureOut">
               <a:rPr lang="en-US" dirty="0"/>
-              <a:t>12/5/2017</a:t>
+              <a:t>12/7/2017</a:t>
             </a:fld>
             <a:endParaRPr lang="en-US" dirty="0"/>
           </a:p>
@@ -6952,7 +6961,7 @@
           <a:p>
             <a:fld id="{48A87A34-81AB-432B-8DAE-1953F412C126}" type="datetimeFigureOut">
               <a:rPr lang="en-US" dirty="0"/>
-              <a:t>12/5/2017</a:t>
+              <a:t>12/7/2017</a:t>
             </a:fld>
             <a:endParaRPr lang="en-US" dirty="0"/>
           </a:p>
@@ -7127,7 +7136,7 @@
           <a:p>
             <a:fld id="{48A87A34-81AB-432B-8DAE-1953F412C126}" type="datetimeFigureOut">
               <a:rPr lang="en-US" dirty="0"/>
-              <a:t>12/5/2017</a:t>
+              <a:t>12/7/2017</a:t>
             </a:fld>
             <a:endParaRPr lang="en-US" dirty="0"/>
           </a:p>
@@ -7292,7 +7301,7 @@
           <a:p>
             <a:fld id="{48A87A34-81AB-432B-8DAE-1953F412C126}" type="datetimeFigureOut">
               <a:rPr lang="en-US" dirty="0"/>
-              <a:t>12/5/2017</a:t>
+              <a:t>12/7/2017</a:t>
             </a:fld>
             <a:endParaRPr lang="en-US" dirty="0"/>
           </a:p>
@@ -7537,7 +7546,7 @@
           <a:p>
             <a:fld id="{48A87A34-81AB-432B-8DAE-1953F412C126}" type="datetimeFigureOut">
               <a:rPr lang="en-US" dirty="0"/>
-              <a:t>12/5/2017</a:t>
+              <a:t>12/7/2017</a:t>
             </a:fld>
             <a:endParaRPr lang="en-US" dirty="0"/>
           </a:p>
@@ -7764,7 +7773,7 @@
           <a:p>
             <a:fld id="{48A87A34-81AB-432B-8DAE-1953F412C126}" type="datetimeFigureOut">
               <a:rPr lang="en-US" dirty="0"/>
-              <a:t>12/5/2017</a:t>
+              <a:t>12/7/2017</a:t>
             </a:fld>
             <a:endParaRPr lang="en-US" dirty="0"/>
           </a:p>
@@ -8140,7 +8149,7 @@
           <a:p>
             <a:fld id="{48A87A34-81AB-432B-8DAE-1953F412C126}" type="datetimeFigureOut">
               <a:rPr lang="en-US" dirty="0"/>
-              <a:t>12/5/2017</a:t>
+              <a:t>12/7/2017</a:t>
             </a:fld>
             <a:endParaRPr lang="en-US" dirty="0"/>
           </a:p>
@@ -8253,7 +8262,7 @@
           <a:p>
             <a:fld id="{48A87A34-81AB-432B-8DAE-1953F412C126}" type="datetimeFigureOut">
               <a:rPr lang="en-US" dirty="0"/>
-              <a:t>12/5/2017</a:t>
+              <a:t>12/7/2017</a:t>
             </a:fld>
             <a:endParaRPr lang="en-US" dirty="0"/>
           </a:p>
@@ -8343,7 +8352,7 @@
           <a:p>
             <a:fld id="{48A87A34-81AB-432B-8DAE-1953F412C126}" type="datetimeFigureOut">
               <a:rPr lang="en-US" dirty="0"/>
-              <a:t>12/5/2017</a:t>
+              <a:t>12/7/2017</a:t>
             </a:fld>
             <a:endParaRPr lang="en-US" dirty="0"/>
           </a:p>
@@ -8587,7 +8596,7 @@
           <a:p>
             <a:fld id="{48A87A34-81AB-432B-8DAE-1953F412C126}" type="datetimeFigureOut">
               <a:rPr lang="en-US" dirty="0"/>
-              <a:t>12/5/2017</a:t>
+              <a:t>12/7/2017</a:t>
             </a:fld>
             <a:endParaRPr lang="en-US" dirty="0"/>
           </a:p>
@@ -8862,7 +8871,7 @@
           <a:p>
             <a:fld id="{48A87A34-81AB-432B-8DAE-1953F412C126}" type="datetimeFigureOut">
               <a:rPr lang="en-US" dirty="0"/>
-              <a:t>12/5/2017</a:t>
+              <a:t>12/7/2017</a:t>
             </a:fld>
             <a:endParaRPr lang="en-US" dirty="0"/>
           </a:p>
@@ -8973,7 +8982,7 @@
           <a:noFill/>
           <a:extLst>
             <a:ext uri="{909E8E84-426E-40dd-AFC4-6F175D3DCCD1}">
-              <a14:hiddenFill xmlns:a14="http://schemas.microsoft.com/office/drawing/2010/main" xmlns="">
+              <a14:hiddenFill xmlns="" xmlns:a14="http://schemas.microsoft.com/office/drawing/2010/main">
                 <a:solidFill>
                   <a:srgbClr val="FFFFFF"/>
                 </a:solidFill>
@@ -9047,7 +9056,7 @@
               </a:ln>
               <a:extLst>
                 <a:ext uri="{91240B29-F687-4f45-9708-019B960494DF}">
-                  <a14:hiddenLine xmlns:a14="http://schemas.microsoft.com/office/drawing/2010/main" xmlns="" w="9525">
+                  <a14:hiddenLine xmlns="" xmlns:a14="http://schemas.microsoft.com/office/drawing/2010/main" w="9525">
                     <a:solidFill>
                       <a:srgbClr val="000000"/>
                     </a:solidFill>
@@ -9137,7 +9146,7 @@
               </a:ln>
               <a:extLst>
                 <a:ext uri="{91240B29-F687-4f45-9708-019B960494DF}">
-                  <a14:hiddenLine xmlns:a14="http://schemas.microsoft.com/office/drawing/2010/main" xmlns="" w="9525">
+                  <a14:hiddenLine xmlns="" xmlns:a14="http://schemas.microsoft.com/office/drawing/2010/main" w="9525">
                     <a:solidFill>
                       <a:srgbClr val="000000"/>
                     </a:solidFill>
@@ -9227,7 +9236,7 @@
               </a:ln>
               <a:extLst>
                 <a:ext uri="{91240B29-F687-4f45-9708-019B960494DF}">
-                  <a14:hiddenLine xmlns:a14="http://schemas.microsoft.com/office/drawing/2010/main" xmlns="" w="9525">
+                  <a14:hiddenLine xmlns="" xmlns:a14="http://schemas.microsoft.com/office/drawing/2010/main" w="9525">
                     <a:solidFill>
                       <a:srgbClr val="000000"/>
                     </a:solidFill>
@@ -9289,7 +9298,7 @@
               </a:ln>
               <a:extLst>
                 <a:ext uri="{91240B29-F687-4f45-9708-019B960494DF}">
-                  <a14:hiddenLine xmlns:a14="http://schemas.microsoft.com/office/drawing/2010/main" xmlns="" w="9525">
+                  <a14:hiddenLine xmlns="" xmlns:a14="http://schemas.microsoft.com/office/drawing/2010/main" w="9525">
                     <a:solidFill>
                       <a:srgbClr val="000000"/>
                     </a:solidFill>
@@ -9379,7 +9388,7 @@
               </a:ln>
               <a:extLst>
                 <a:ext uri="{91240B29-F687-4f45-9708-019B960494DF}">
-                  <a14:hiddenLine xmlns:a14="http://schemas.microsoft.com/office/drawing/2010/main" xmlns="" w="9525">
+                  <a14:hiddenLine xmlns="" xmlns:a14="http://schemas.microsoft.com/office/drawing/2010/main" w="9525">
                     <a:solidFill>
                       <a:srgbClr val="000000"/>
                     </a:solidFill>
@@ -9441,7 +9450,7 @@
               </a:ln>
               <a:extLst>
                 <a:ext uri="{91240B29-F687-4f45-9708-019B960494DF}">
-                  <a14:hiddenLine xmlns:a14="http://schemas.microsoft.com/office/drawing/2010/main" xmlns="" w="9525">
+                  <a14:hiddenLine xmlns="" xmlns:a14="http://schemas.microsoft.com/office/drawing/2010/main" w="9525">
                     <a:solidFill>
                       <a:srgbClr val="000000"/>
                     </a:solidFill>
@@ -9503,7 +9512,7 @@
               </a:ln>
               <a:extLst>
                 <a:ext uri="{91240B29-F687-4f45-9708-019B960494DF}">
-                  <a14:hiddenLine xmlns:a14="http://schemas.microsoft.com/office/drawing/2010/main" xmlns="" w="9525">
+                  <a14:hiddenLine xmlns="" xmlns:a14="http://schemas.microsoft.com/office/drawing/2010/main" w="9525">
                     <a:solidFill>
                       <a:srgbClr val="000000"/>
                     </a:solidFill>
@@ -9593,7 +9602,7 @@
               </a:ln>
               <a:extLst>
                 <a:ext uri="{91240B29-F687-4f45-9708-019B960494DF}">
-                  <a14:hiddenLine xmlns:a14="http://schemas.microsoft.com/office/drawing/2010/main" xmlns="" w="9525">
+                  <a14:hiddenLine xmlns="" xmlns:a14="http://schemas.microsoft.com/office/drawing/2010/main" w="9525">
                     <a:solidFill>
                       <a:srgbClr val="000000"/>
                     </a:solidFill>
@@ -9683,7 +9692,7 @@
               </a:ln>
               <a:extLst>
                 <a:ext uri="{91240B29-F687-4f45-9708-019B960494DF}">
-                  <a14:hiddenLine xmlns:a14="http://schemas.microsoft.com/office/drawing/2010/main" xmlns="" w="9525">
+                  <a14:hiddenLine xmlns="" xmlns:a14="http://schemas.microsoft.com/office/drawing/2010/main" w="9525">
                     <a:solidFill>
                       <a:srgbClr val="000000"/>
                     </a:solidFill>
@@ -9745,7 +9754,7 @@
               </a:ln>
               <a:extLst>
                 <a:ext uri="{91240B29-F687-4f45-9708-019B960494DF}">
-                  <a14:hiddenLine xmlns:a14="http://schemas.microsoft.com/office/drawing/2010/main" xmlns="" w="9525">
+                  <a14:hiddenLine xmlns="" xmlns:a14="http://schemas.microsoft.com/office/drawing/2010/main" w="9525">
                     <a:solidFill>
                       <a:srgbClr val="000000"/>
                     </a:solidFill>
@@ -9855,7 +9864,7 @@
               </a:ln>
               <a:extLst>
                 <a:ext uri="{91240B29-F687-4f45-9708-019B960494DF}">
-                  <a14:hiddenLine xmlns:a14="http://schemas.microsoft.com/office/drawing/2010/main" xmlns="" w="9525">
+                  <a14:hiddenLine xmlns="" xmlns:a14="http://schemas.microsoft.com/office/drawing/2010/main" w="9525">
                     <a:solidFill>
                       <a:srgbClr val="000000"/>
                     </a:solidFill>
@@ -9939,7 +9948,7 @@
               </a:ln>
               <a:extLst>
                 <a:ext uri="{91240B29-F687-4f45-9708-019B960494DF}">
-                  <a14:hiddenLine xmlns:a14="http://schemas.microsoft.com/office/drawing/2010/main" xmlns="" w="9525">
+                  <a14:hiddenLine xmlns="" xmlns:a14="http://schemas.microsoft.com/office/drawing/2010/main" w="9525">
                     <a:solidFill>
                       <a:srgbClr val="000000"/>
                     </a:solidFill>
@@ -10001,7 +10010,7 @@
               </a:ln>
               <a:extLst>
                 <a:ext uri="{91240B29-F687-4f45-9708-019B960494DF}">
-                  <a14:hiddenLine xmlns:a14="http://schemas.microsoft.com/office/drawing/2010/main" xmlns="" w="9525">
+                  <a14:hiddenLine xmlns="" xmlns:a14="http://schemas.microsoft.com/office/drawing/2010/main" w="9525">
                     <a:solidFill>
                       <a:srgbClr val="000000"/>
                     </a:solidFill>
@@ -10063,7 +10072,7 @@
               </a:ln>
               <a:extLst>
                 <a:ext uri="{91240B29-F687-4f45-9708-019B960494DF}">
-                  <a14:hiddenLine xmlns:a14="http://schemas.microsoft.com/office/drawing/2010/main" xmlns="" w="9525">
+                  <a14:hiddenLine xmlns="" xmlns:a14="http://schemas.microsoft.com/office/drawing/2010/main" w="9525">
                     <a:solidFill>
                       <a:srgbClr val="000000"/>
                     </a:solidFill>
@@ -10153,7 +10162,7 @@
               </a:ln>
               <a:extLst>
                 <a:ext uri="{91240B29-F687-4f45-9708-019B960494DF}">
-                  <a14:hiddenLine xmlns:a14="http://schemas.microsoft.com/office/drawing/2010/main" xmlns="" w="9525">
+                  <a14:hiddenLine xmlns="" xmlns:a14="http://schemas.microsoft.com/office/drawing/2010/main" w="9525">
                     <a:solidFill>
                       <a:srgbClr val="000000"/>
                     </a:solidFill>
@@ -10187,7 +10196,7 @@
               </a:ln>
               <a:extLst>
                 <a:ext uri="{91240B29-F687-4f45-9708-019B960494DF}">
-                  <a14:hiddenLine xmlns:a14="http://schemas.microsoft.com/office/drawing/2010/main" xmlns="" w="9525">
+                  <a14:hiddenLine xmlns="" xmlns:a14="http://schemas.microsoft.com/office/drawing/2010/main" w="9525">
                     <a:solidFill>
                       <a:srgbClr val="000000"/>
                     </a:solidFill>
@@ -10252,7 +10261,7 @@
               </a:ln>
               <a:extLst>
                 <a:ext uri="{91240B29-F687-4f45-9708-019B960494DF}">
-                  <a14:hiddenLine xmlns:a14="http://schemas.microsoft.com/office/drawing/2010/main" xmlns="" w="9525">
+                  <a14:hiddenLine xmlns="" xmlns:a14="http://schemas.microsoft.com/office/drawing/2010/main" w="9525">
                     <a:solidFill>
                       <a:srgbClr val="000000"/>
                     </a:solidFill>
@@ -10342,7 +10351,7 @@
               </a:ln>
               <a:extLst>
                 <a:ext uri="{91240B29-F687-4f45-9708-019B960494DF}">
-                  <a14:hiddenLine xmlns:a14="http://schemas.microsoft.com/office/drawing/2010/main" xmlns="" w="9525">
+                  <a14:hiddenLine xmlns="" xmlns:a14="http://schemas.microsoft.com/office/drawing/2010/main" w="9525">
                     <a:solidFill>
                       <a:srgbClr val="000000"/>
                     </a:solidFill>
@@ -10404,7 +10413,7 @@
               </a:ln>
               <a:extLst>
                 <a:ext uri="{91240B29-F687-4f45-9708-019B960494DF}">
-                  <a14:hiddenLine xmlns:a14="http://schemas.microsoft.com/office/drawing/2010/main" xmlns="" w="9525">
+                  <a14:hiddenLine xmlns="" xmlns:a14="http://schemas.microsoft.com/office/drawing/2010/main" w="9525">
                     <a:solidFill>
                       <a:srgbClr val="000000"/>
                     </a:solidFill>
@@ -10494,7 +10503,7 @@
               </a:ln>
               <a:extLst>
                 <a:ext uri="{91240B29-F687-4f45-9708-019B960494DF}">
-                  <a14:hiddenLine xmlns:a14="http://schemas.microsoft.com/office/drawing/2010/main" xmlns="" w="9525">
+                  <a14:hiddenLine xmlns="" xmlns:a14="http://schemas.microsoft.com/office/drawing/2010/main" w="9525">
                     <a:solidFill>
                       <a:srgbClr val="000000"/>
                     </a:solidFill>
@@ -10559,7 +10568,7 @@
               </a:ln>
               <a:extLst>
                 <a:ext uri="{91240B29-F687-4f45-9708-019B960494DF}">
-                  <a14:hiddenLine xmlns:a14="http://schemas.microsoft.com/office/drawing/2010/main" xmlns="" w="9525">
+                  <a14:hiddenLine xmlns="" xmlns:a14="http://schemas.microsoft.com/office/drawing/2010/main" w="9525">
                     <a:solidFill>
                       <a:srgbClr val="000000"/>
                     </a:solidFill>
@@ -10621,7 +10630,7 @@
               </a:ln>
               <a:extLst>
                 <a:ext uri="{91240B29-F687-4f45-9708-019B960494DF}">
-                  <a14:hiddenLine xmlns:a14="http://schemas.microsoft.com/office/drawing/2010/main" xmlns="" w="9525">
+                  <a14:hiddenLine xmlns="" xmlns:a14="http://schemas.microsoft.com/office/drawing/2010/main" w="9525">
                     <a:solidFill>
                       <a:srgbClr val="000000"/>
                     </a:solidFill>
@@ -10711,7 +10720,7 @@
               </a:ln>
               <a:extLst>
                 <a:ext uri="{91240B29-F687-4f45-9708-019B960494DF}">
-                  <a14:hiddenLine xmlns:a14="http://schemas.microsoft.com/office/drawing/2010/main" xmlns="" w="9525">
+                  <a14:hiddenLine xmlns="" xmlns:a14="http://schemas.microsoft.com/office/drawing/2010/main" w="9525">
                     <a:solidFill>
                       <a:srgbClr val="000000"/>
                     </a:solidFill>
@@ -10801,7 +10810,7 @@
               </a:ln>
               <a:extLst>
                 <a:ext uri="{91240B29-F687-4f45-9708-019B960494DF}">
-                  <a14:hiddenLine xmlns:a14="http://schemas.microsoft.com/office/drawing/2010/main" xmlns="" w="9525">
+                  <a14:hiddenLine xmlns="" xmlns:a14="http://schemas.microsoft.com/office/drawing/2010/main" w="9525">
                     <a:solidFill>
                       <a:srgbClr val="000000"/>
                     </a:solidFill>
@@ -10866,7 +10875,7 @@
               </a:ln>
               <a:extLst>
                 <a:ext uri="{91240B29-F687-4f45-9708-019B960494DF}">
-                  <a14:hiddenLine xmlns:a14="http://schemas.microsoft.com/office/drawing/2010/main" xmlns="" w="9525">
+                  <a14:hiddenLine xmlns="" xmlns:a14="http://schemas.microsoft.com/office/drawing/2010/main" w="9525">
                     <a:solidFill>
                       <a:srgbClr val="000000"/>
                     </a:solidFill>
@@ -10986,7 +10995,7 @@
               </a:ln>
               <a:extLst>
                 <a:ext uri="{91240B29-F687-4f45-9708-019B960494DF}">
-                  <a14:hiddenLine xmlns:a14="http://schemas.microsoft.com/office/drawing/2010/main" xmlns="" w="9525">
+                  <a14:hiddenLine xmlns="" xmlns:a14="http://schemas.microsoft.com/office/drawing/2010/main" w="9525">
                     <a:solidFill>
                       <a:srgbClr val="000000"/>
                     </a:solidFill>
@@ -11084,7 +11093,7 @@
               </a:ln>
               <a:extLst>
                 <a:ext uri="{91240B29-F687-4f45-9708-019B960494DF}">
-                  <a14:hiddenLine xmlns:a14="http://schemas.microsoft.com/office/drawing/2010/main" xmlns="" w="9525">
+                  <a14:hiddenLine xmlns="" xmlns:a14="http://schemas.microsoft.com/office/drawing/2010/main" w="9525">
                     <a:solidFill>
                       <a:srgbClr val="000000"/>
                     </a:solidFill>
@@ -11199,7 +11208,7 @@
               </a:ln>
               <a:extLst>
                 <a:ext uri="{91240B29-F687-4f45-9708-019B960494DF}">
-                  <a14:hiddenLine xmlns:a14="http://schemas.microsoft.com/office/drawing/2010/main" xmlns="" w="9525">
+                  <a14:hiddenLine xmlns="" xmlns:a14="http://schemas.microsoft.com/office/drawing/2010/main" w="9525">
                     <a:solidFill>
                       <a:srgbClr val="000000"/>
                     </a:solidFill>
@@ -11289,7 +11298,7 @@
               </a:ln>
               <a:extLst>
                 <a:ext uri="{91240B29-F687-4f45-9708-019B960494DF}">
-                  <a14:hiddenLine xmlns:a14="http://schemas.microsoft.com/office/drawing/2010/main" xmlns="" w="9525">
+                  <a14:hiddenLine xmlns="" xmlns:a14="http://schemas.microsoft.com/office/drawing/2010/main" w="9525">
                     <a:solidFill>
                       <a:srgbClr val="000000"/>
                     </a:solidFill>
@@ -11354,7 +11363,7 @@
               </a:ln>
               <a:extLst>
                 <a:ext uri="{91240B29-F687-4f45-9708-019B960494DF}">
-                  <a14:hiddenLine xmlns:a14="http://schemas.microsoft.com/office/drawing/2010/main" xmlns="" w="9525">
+                  <a14:hiddenLine xmlns="" xmlns:a14="http://schemas.microsoft.com/office/drawing/2010/main" w="9525">
                     <a:solidFill>
                       <a:srgbClr val="000000"/>
                     </a:solidFill>
@@ -11444,7 +11453,7 @@
               </a:ln>
               <a:extLst>
                 <a:ext uri="{91240B29-F687-4f45-9708-019B960494DF}">
-                  <a14:hiddenLine xmlns:a14="http://schemas.microsoft.com/office/drawing/2010/main" xmlns="" w="9525">
+                  <a14:hiddenLine xmlns="" xmlns:a14="http://schemas.microsoft.com/office/drawing/2010/main" w="9525">
                     <a:solidFill>
                       <a:srgbClr val="000000"/>
                     </a:solidFill>
@@ -11512,7 +11521,7 @@
               </a:ln>
               <a:extLst>
                 <a:ext uri="{91240B29-F687-4f45-9708-019B960494DF}">
-                  <a14:hiddenLine xmlns:a14="http://schemas.microsoft.com/office/drawing/2010/main" xmlns="" w="9525">
+                  <a14:hiddenLine xmlns="" xmlns:a14="http://schemas.microsoft.com/office/drawing/2010/main" w="9525">
                     <a:solidFill>
                       <a:srgbClr val="000000"/>
                     </a:solidFill>
@@ -11602,7 +11611,7 @@
               </a:ln>
               <a:extLst>
                 <a:ext uri="{91240B29-F687-4f45-9708-019B960494DF}">
-                  <a14:hiddenLine xmlns:a14="http://schemas.microsoft.com/office/drawing/2010/main" xmlns="" w="9525">
+                  <a14:hiddenLine xmlns="" xmlns:a14="http://schemas.microsoft.com/office/drawing/2010/main" w="9525">
                     <a:solidFill>
                       <a:srgbClr val="000000"/>
                     </a:solidFill>
@@ -11670,7 +11679,7 @@
               </a:ln>
               <a:extLst>
                 <a:ext uri="{91240B29-F687-4f45-9708-019B960494DF}">
-                  <a14:hiddenLine xmlns:a14="http://schemas.microsoft.com/office/drawing/2010/main" xmlns="" w="9525">
+                  <a14:hiddenLine xmlns="" xmlns:a14="http://schemas.microsoft.com/office/drawing/2010/main" w="9525">
                     <a:solidFill>
                       <a:srgbClr val="000000"/>
                     </a:solidFill>
@@ -11760,7 +11769,7 @@
               </a:ln>
               <a:extLst>
                 <a:ext uri="{91240B29-F687-4f45-9708-019B960494DF}">
-                  <a14:hiddenLine xmlns:a14="http://schemas.microsoft.com/office/drawing/2010/main" xmlns="" w="9525">
+                  <a14:hiddenLine xmlns="" xmlns:a14="http://schemas.microsoft.com/office/drawing/2010/main" w="9525">
                     <a:solidFill>
                       <a:srgbClr val="000000"/>
                     </a:solidFill>
@@ -11794,7 +11803,7 @@
               </a:ln>
               <a:extLst>
                 <a:ext uri="{91240B29-F687-4f45-9708-019B960494DF}">
-                  <a14:hiddenLine xmlns:a14="http://schemas.microsoft.com/office/drawing/2010/main" xmlns="" w="9525">
+                  <a14:hiddenLine xmlns="" xmlns:a14="http://schemas.microsoft.com/office/drawing/2010/main" w="9525">
                     <a:solidFill>
                       <a:srgbClr val="000000"/>
                     </a:solidFill>
@@ -11935,7 +11944,7 @@
             <a:fld id="{48A87A34-81AB-432B-8DAE-1953F412C126}" type="datetimeFigureOut">
               <a:rPr lang="en-US" dirty="0"/>
               <a:pPr/>
-              <a:t>12/5/2017</a:t>
+              <a:t>12/7/2017</a:t>
             </a:fld>
             <a:endParaRPr lang="en-US" dirty="0"/>
           </a:p>
@@ -12402,8 +12411,8 @@
         </p:nvSpPr>
         <p:spPr>
           <a:xfrm>
-            <a:off x="1876424" y="3602038"/>
-            <a:ext cx="8791575" cy="2765206"/>
+            <a:off x="1876424" y="2936147"/>
+            <a:ext cx="8791575" cy="3431097"/>
           </a:xfrm>
         </p:spPr>
         <p:txBody>
@@ -12411,6 +12420,9 @@
             <a:normAutofit/>
           </a:bodyPr>
           <a:lstStyle/>
+          <a:p>
+            <a:endParaRPr lang="en-US" dirty="0"/>
+          </a:p>
           <a:p>
             <a:pPr marL="342900" indent="-342900">
               <a:buFont typeface="Arial" panose="020B0604020202020204" pitchFamily="34" charset="0"/>
@@ -12516,7 +12528,7 @@
           <a:p>
             <a:r>
               <a:rPr lang="en-US" dirty="0"/>
-              <a:t>Active record</a:t>
+              <a:t>Active record Pattern</a:t>
             </a:r>
           </a:p>
         </p:txBody>
@@ -12542,7 +12554,22 @@
           <a:bodyPr/>
           <a:lstStyle/>
           <a:p>
-            <a:endParaRPr lang="en-US" dirty="0"/>
+            <a:r>
+              <a:rPr lang="en-US" dirty="0"/>
+              <a:t>“An object that wraps a row in a database table or view, encapsulates the database access, and adds domain logic on that data.” – Martin Fowler</a:t>
+            </a:r>
+          </a:p>
+          <a:p>
+            <a:r>
+              <a:rPr lang="en-US" dirty="0"/>
+              <a:t>Helps create an interface between your data objects and the datastore. </a:t>
+            </a:r>
+          </a:p>
+          <a:p>
+            <a:r>
+              <a:rPr lang="en-US" dirty="0"/>
+              <a:t>An instance of an object would be represented on the Table as a single row</a:t>
+            </a:r>
           </a:p>
         </p:txBody>
       </p:sp>
@@ -12625,6 +12652,30 @@
           <a:bodyPr/>
           <a:lstStyle/>
           <a:p>
+            <a:r>
+              <a:rPr lang="en-US" dirty="0"/>
+              <a:t>Object Relational Mapping – Is the most common way to implement the Active Record Pattern. </a:t>
+            </a:r>
+          </a:p>
+          <a:p>
+            <a:r>
+              <a:rPr lang="en-US" dirty="0"/>
+              <a:t>Maps objects to database tables</a:t>
+            </a:r>
+          </a:p>
+          <a:p>
+            <a:r>
+              <a:rPr lang="en-US" dirty="0"/>
+              <a:t>Pulls scalar values off the table and converts it to an object</a:t>
+            </a:r>
+          </a:p>
+          <a:p>
+            <a:r>
+              <a:rPr lang="en-US" dirty="0"/>
+              <a:t>Converts objects into scalar values to be pushed to a database</a:t>
+            </a:r>
+          </a:p>
+          <a:p>
             <a:endParaRPr lang="en-US" dirty="0"/>
           </a:p>
         </p:txBody>
@@ -12708,7 +12759,30 @@
           <a:bodyPr/>
           <a:lstStyle/>
           <a:p>
-            <a:endParaRPr lang="en-US" dirty="0"/>
+            <a:r>
+              <a:rPr lang="en-US" dirty="0"/>
+              <a:t>Make it easier to step into a new project – the database will be represented by objects that are easier to understand than multiple tables</a:t>
+            </a:r>
+          </a:p>
+          <a:p>
+            <a:r>
+              <a:rPr lang="en-US" dirty="0"/>
+              <a:t>Once configured, simple and easy to use. Call save, update, and delete methods on objects. Instead of having to write </a:t>
+            </a:r>
+            <a:r>
+              <a:rPr lang="en-US" dirty="0" err="1"/>
+              <a:t>sql</a:t>
+            </a:r>
+            <a:r>
+              <a:rPr lang="en-US" dirty="0"/>
+              <a:t> functions for each new class you add to your program.</a:t>
+            </a:r>
+          </a:p>
+          <a:p>
+            <a:r>
+              <a:rPr lang="en-US" dirty="0"/>
+              <a:t>Preserves created objects on databases and can easy load them back into memory</a:t>
+            </a:r>
           </a:p>
         </p:txBody>
       </p:sp>
@@ -12791,7 +12865,22 @@
           <a:bodyPr/>
           <a:lstStyle/>
           <a:p>
-            <a:endParaRPr lang="en-US"/>
+            <a:r>
+              <a:rPr lang="en-US" dirty="0"/>
+              <a:t>Coupling – Objects coupled to the database in structure, not the use. </a:t>
+            </a:r>
+          </a:p>
+          <a:p>
+            <a:r>
+              <a:rPr lang="en-US" dirty="0"/>
+              <a:t>Testing – Testing becomes difficult because of the coupling, it’s hard to separate objects from the database and vice versa. </a:t>
+            </a:r>
+          </a:p>
+          <a:p>
+            <a:r>
+              <a:rPr lang="en-US" dirty="0"/>
+              <a:t>Performance – If there are multiple tables representing one object, the SQL queries can start to slow down.</a:t>
+            </a:r>
           </a:p>
         </p:txBody>
       </p:sp>
@@ -12878,7 +12967,28 @@
           <a:bodyPr/>
           <a:lstStyle/>
           <a:p>
-            <a:endParaRPr lang="en-US" dirty="0"/>
+            <a:r>
+              <a:rPr lang="en-US" dirty="0"/>
+              <a:t>Object-relational mapping tool for Java</a:t>
+            </a:r>
+          </a:p>
+          <a:p>
+            <a:r>
+              <a:rPr lang="en-US" dirty="0"/>
+              <a:t>Implements JPA (Java Persistence API)</a:t>
+            </a:r>
+          </a:p>
+          <a:p>
+            <a:r>
+              <a:rPr lang="en-US" dirty="0"/>
+              <a:t>Faster than JDBC (Java Database Connectivity) and easier to use. The developer doesn’t have to write code to map the objects to the database (needed to do in JDBC).</a:t>
+            </a:r>
+          </a:p>
+          <a:p>
+            <a:r>
+              <a:rPr lang="en-US" dirty="0"/>
+              <a:t>Provides it’s own Query Language and supports native SQL statements</a:t>
+            </a:r>
           </a:p>
         </p:txBody>
       </p:sp>
@@ -12961,7 +13071,27 @@
           <a:bodyPr/>
           <a:lstStyle/>
           <a:p>
-            <a:endParaRPr lang="en-US"/>
+            <a:r>
+              <a:rPr lang="en-US" dirty="0"/>
+              <a:t>Can be imported through maven</a:t>
+            </a:r>
+          </a:p>
+          <a:p>
+            <a:r>
+              <a:rPr lang="en-US" dirty="0"/>
+              <a:t>Maps an entity to a table. An entity would be Parts.java, that class would be mapped to a table. The object would be mapped to rows. </a:t>
+            </a:r>
+          </a:p>
+          <a:p>
+            <a:r>
+              <a:rPr lang="en-US" dirty="0"/>
+              <a:t>Uses annotations (@Entity, @Id, @Table, </a:t>
+            </a:r>
+            <a:r>
+              <a:rPr lang="en-US"/>
+              <a:t>@Column</a:t>
+            </a:r>
+            <a:endParaRPr lang="en-US" dirty="0"/>
           </a:p>
         </p:txBody>
       </p:sp>

</xml_diff>